<commit_message>
Ahora con el desfile
</commit_message>
<xml_diff>
--- a/inputs/Plantilla.pptx
+++ b/inputs/Plantilla.pptx
@@ -4,9 +4,6 @@
   <p:sldMasterIdLst>
     <p:sldMasterId id="2147483648" r:id="rId1"/>
   </p:sldMasterIdLst>
-  <p:sldIdLst>
-    <p:sldId id="256" r:id="rId2"/>
-  </p:sldIdLst>
   <p:sldSz cx="12192000" cy="6858000"/>
   <p:notesSz cx="6858000" cy="9144000"/>
   <p:defaultTextStyle>
@@ -1012,40 +1009,40 @@
         </p:nvSpPr>
         <p:spPr/>
         <p:txBody>
-          <a:bodyPr/>
+          <a:bodyPr numCol="2"/>
           <a:lstStyle/>
           <a:p>
             <a:pPr lvl="0"/>
             <a:r>
-              <a:rPr lang="en-US"/>
+              <a:rPr lang="en-US" dirty="0"/>
               <a:t>Click to edit Master text styles</a:t>
             </a:r>
           </a:p>
           <a:p>
             <a:pPr lvl="1"/>
             <a:r>
-              <a:rPr lang="en-US"/>
+              <a:rPr lang="en-US" dirty="0"/>
               <a:t>Second level</a:t>
             </a:r>
           </a:p>
           <a:p>
             <a:pPr lvl="2"/>
             <a:r>
-              <a:rPr lang="en-US"/>
+              <a:rPr lang="en-US" dirty="0"/>
               <a:t>Third level</a:t>
             </a:r>
           </a:p>
           <a:p>
             <a:pPr lvl="3"/>
             <a:r>
-              <a:rPr lang="en-US"/>
+              <a:rPr lang="en-US" dirty="0"/>
               <a:t>Fourth level</a:t>
             </a:r>
           </a:p>
           <a:p>
             <a:pPr lvl="4"/>
             <a:r>
-              <a:rPr lang="en-US"/>
+              <a:rPr lang="en-US" dirty="0"/>
               <a:t>Fifth level</a:t>
             </a:r>
           </a:p>
@@ -2691,7 +2688,7 @@
           </a:xfrm>
         </p:spPr>
         <p:txBody>
-          <a:bodyPr/>
+          <a:bodyPr numCol="1"/>
           <a:lstStyle>
             <a:lvl1pPr marL="0" indent="0">
               <a:buNone/>
@@ -2891,7 +2888,7 @@
           </a:prstGeom>
         </p:spPr>
         <p:txBody>
-          <a:bodyPr vert="horz" lIns="91440" tIns="45720" rIns="91440" bIns="45720" rtlCol="0">
+          <a:bodyPr vert="horz" lIns="91440" tIns="45720" rIns="91440" bIns="45720" numCol="2" rtlCol="0">
             <a:normAutofit/>
           </a:bodyPr>
           <a:lstStyle/>
@@ -3324,86 +3321,6 @@
     </p:otherStyle>
   </p:txStyles>
 </p:sldMaster>
-</file>
-
-<file path=ppt/slides/slide1.xml><?xml version="1.0" encoding="utf-8"?>
-<p:sld xmlns:a="http://schemas.openxmlformats.org/drawingml/2006/main" xmlns:r="http://schemas.openxmlformats.org/officeDocument/2006/relationships" xmlns:p="http://schemas.openxmlformats.org/presentationml/2006/main">
-  <p:cSld>
-    <p:spTree>
-      <p:nvGrpSpPr>
-        <p:cNvPr id="1" name=""/>
-        <p:cNvGrpSpPr/>
-        <p:nvPr/>
-      </p:nvGrpSpPr>
-      <p:grpSpPr>
-        <a:xfrm>
-          <a:off x="0" y="0"/>
-          <a:ext cx="0" cy="0"/>
-          <a:chOff x="0" y="0"/>
-          <a:chExt cx="0" cy="0"/>
-        </a:xfrm>
-      </p:grpSpPr>
-      <p:sp>
-        <p:nvSpPr>
-          <p:cNvPr id="2" name="Title 1">
-            <a:extLst>
-              <a:ext uri="{FF2B5EF4-FFF2-40B4-BE49-F238E27FC236}">
-                <a16:creationId xmlns:a16="http://schemas.microsoft.com/office/drawing/2014/main" id="{D89A0773-600B-36A2-7DF1-7E32D2F5B4E5}"/>
-              </a:ext>
-            </a:extLst>
-          </p:cNvPr>
-          <p:cNvSpPr>
-            <a:spLocks noGrp="1"/>
-          </p:cNvSpPr>
-          <p:nvPr>
-            <p:ph type="ctrTitle"/>
-          </p:nvPr>
-        </p:nvSpPr>
-        <p:spPr/>
-        <p:txBody>
-          <a:bodyPr/>
-          <a:lstStyle/>
-          <a:p>
-            <a:endParaRPr lang="es-MX"/>
-          </a:p>
-        </p:txBody>
-      </p:sp>
-      <p:sp>
-        <p:nvSpPr>
-          <p:cNvPr id="3" name="Subtitle 2">
-            <a:extLst>
-              <a:ext uri="{FF2B5EF4-FFF2-40B4-BE49-F238E27FC236}">
-                <a16:creationId xmlns:a16="http://schemas.microsoft.com/office/drawing/2014/main" id="{8CC86F98-D39A-5D82-D66F-1BC08C63A043}"/>
-              </a:ext>
-            </a:extLst>
-          </p:cNvPr>
-          <p:cNvSpPr>
-            <a:spLocks noGrp="1"/>
-          </p:cNvSpPr>
-          <p:nvPr>
-            <p:ph type="subTitle" idx="1"/>
-          </p:nvPr>
-        </p:nvSpPr>
-        <p:spPr/>
-        <p:txBody>
-          <a:bodyPr/>
-          <a:lstStyle/>
-          <a:p>
-            <a:endParaRPr lang="es-MX"/>
-          </a:p>
-        </p:txBody>
-      </p:sp>
-    </p:spTree>
-    <p:extLst>
-      <p:ext uri="{BB962C8B-B14F-4D97-AF65-F5344CB8AC3E}">
-        <p14:creationId xmlns:p14="http://schemas.microsoft.com/office/powerpoint/2010/main" val="347836183"/>
-      </p:ext>
-    </p:extLst>
-  </p:cSld>
-  <p:clrMapOvr>
-    <a:masterClrMapping/>
-  </p:clrMapOvr>
-</p:sld>
 </file>
 
 <file path=ppt/theme/theme1.xml><?xml version="1.0" encoding="utf-8"?>

</xml_diff>